<commit_message>
Changed seyoung's user stories
</commit_message>
<xml_diff>
--- a/User_story/Seyoung User Stories.pptx
+++ b/User_story/Seyoung User Stories.pptx
@@ -116,6 +116,10 @@
     </p:ext>
   </p:extLst>
 </p:presentation>
+</file>
+
+<file path=ppt/revisionInfo.xml><?xml version="1.0" encoding="utf-8"?>
+<p1510:revInfo xmlns:a="http://schemas.openxmlformats.org/drawingml/2006/main" xmlns:r="http://schemas.openxmlformats.org/officeDocument/2006/relationships" xmlns:p1510="http://schemas.microsoft.com/office/powerpoint/2015/10/main"/>
 </file>
 
 <file path=ppt/slideLayouts/slideLayout1.xml><?xml version="1.0" encoding="utf-8"?>
@@ -3030,7 +3034,7 @@
                   <a:schemeClr val="tx1"/>
                 </a:solidFill>
               </a:rPr>
-              <a:t>Story ID 0</a:t>
+              <a:t>Story ID </a:t>
             </a:r>
           </a:p>
         </p:txBody>
@@ -3502,7 +3506,7 @@
                   <a:schemeClr val="tx1"/>
                 </a:solidFill>
               </a:rPr>
-              <a:t>Story ID 0</a:t>
+              <a:t>Story ID </a:t>
             </a:r>
           </a:p>
         </p:txBody>
@@ -3975,7 +3979,7 @@
                   <a:schemeClr val="tx1"/>
                 </a:solidFill>
               </a:rPr>
-              <a:t>Story ID 0</a:t>
+              <a:t>Story ID </a:t>
             </a:r>
           </a:p>
         </p:txBody>
@@ -4555,7 +4559,7 @@
                   <a:schemeClr val="tx1"/>
                 </a:solidFill>
               </a:rPr>
-              <a:t>Story ID 0</a:t>
+              <a:t>Story ID </a:t>
             </a:r>
           </a:p>
         </p:txBody>
@@ -5032,7 +5036,7 @@
                   <a:schemeClr val="tx1"/>
                 </a:solidFill>
               </a:rPr>
-              <a:t>Story ID 0</a:t>
+              <a:t>Story ID </a:t>
             </a:r>
           </a:p>
         </p:txBody>
@@ -5523,7 +5527,7 @@
                   <a:schemeClr val="tx1"/>
                 </a:solidFill>
               </a:rPr>
-              <a:t>Story ID 0</a:t>
+              <a:t>Story ID </a:t>
             </a:r>
           </a:p>
         </p:txBody>

</xml_diff>